<commit_message>
Java Basico - Cliente &  Conta Corente Completo
</commit_message>
<xml_diff>
--- a/UC11 - Modelagem de Sistemas/SA1 - Atividade 3 - Presencial - Modelagem de Sistemas e Diagrama de Classe/mat_auxiliar/Banco_Diagrama de classes.pptx
+++ b/UC11 - Modelagem de Sistemas/SA1 - Atividade 3 - Presencial - Modelagem de Sistemas e Diagrama de Classe/mat_auxiliar/Banco_Diagrama de classes.pptx
@@ -261,7 +261,7 @@
           <a:p>
             <a:fld id="{A613E9C6-444C-4D4F-8D4C-73E06C73E8DA}" type="datetimeFigureOut">
               <a:rPr lang="pt-BR" smtClean="0"/>
-              <a:t>13/11/2021</a:t>
+              <a:t>14/11/2021</a:t>
             </a:fld>
             <a:endParaRPr lang="pt-BR"/>
           </a:p>
@@ -461,7 +461,7 @@
           <a:p>
             <a:fld id="{A613E9C6-444C-4D4F-8D4C-73E06C73E8DA}" type="datetimeFigureOut">
               <a:rPr lang="pt-BR" smtClean="0"/>
-              <a:t>13/11/2021</a:t>
+              <a:t>14/11/2021</a:t>
             </a:fld>
             <a:endParaRPr lang="pt-BR"/>
           </a:p>
@@ -671,7 +671,7 @@
           <a:p>
             <a:fld id="{A613E9C6-444C-4D4F-8D4C-73E06C73E8DA}" type="datetimeFigureOut">
               <a:rPr lang="pt-BR" smtClean="0"/>
-              <a:t>13/11/2021</a:t>
+              <a:t>14/11/2021</a:t>
             </a:fld>
             <a:endParaRPr lang="pt-BR"/>
           </a:p>
@@ -871,7 +871,7 @@
           <a:p>
             <a:fld id="{A613E9C6-444C-4D4F-8D4C-73E06C73E8DA}" type="datetimeFigureOut">
               <a:rPr lang="pt-BR" smtClean="0"/>
-              <a:t>13/11/2021</a:t>
+              <a:t>14/11/2021</a:t>
             </a:fld>
             <a:endParaRPr lang="pt-BR"/>
           </a:p>
@@ -1147,7 +1147,7 @@
           <a:p>
             <a:fld id="{A613E9C6-444C-4D4F-8D4C-73E06C73E8DA}" type="datetimeFigureOut">
               <a:rPr lang="pt-BR" smtClean="0"/>
-              <a:t>13/11/2021</a:t>
+              <a:t>14/11/2021</a:t>
             </a:fld>
             <a:endParaRPr lang="pt-BR"/>
           </a:p>
@@ -1415,7 +1415,7 @@
           <a:p>
             <a:fld id="{A613E9C6-444C-4D4F-8D4C-73E06C73E8DA}" type="datetimeFigureOut">
               <a:rPr lang="pt-BR" smtClean="0"/>
-              <a:t>13/11/2021</a:t>
+              <a:t>14/11/2021</a:t>
             </a:fld>
             <a:endParaRPr lang="pt-BR"/>
           </a:p>
@@ -1830,7 +1830,7 @@
           <a:p>
             <a:fld id="{A613E9C6-444C-4D4F-8D4C-73E06C73E8DA}" type="datetimeFigureOut">
               <a:rPr lang="pt-BR" smtClean="0"/>
-              <a:t>13/11/2021</a:t>
+              <a:t>14/11/2021</a:t>
             </a:fld>
             <a:endParaRPr lang="pt-BR"/>
           </a:p>
@@ -1972,7 +1972,7 @@
           <a:p>
             <a:fld id="{A613E9C6-444C-4D4F-8D4C-73E06C73E8DA}" type="datetimeFigureOut">
               <a:rPr lang="pt-BR" smtClean="0"/>
-              <a:t>13/11/2021</a:t>
+              <a:t>14/11/2021</a:t>
             </a:fld>
             <a:endParaRPr lang="pt-BR"/>
           </a:p>
@@ -2085,7 +2085,7 @@
           <a:p>
             <a:fld id="{A613E9C6-444C-4D4F-8D4C-73E06C73E8DA}" type="datetimeFigureOut">
               <a:rPr lang="pt-BR" smtClean="0"/>
-              <a:t>13/11/2021</a:t>
+              <a:t>14/11/2021</a:t>
             </a:fld>
             <a:endParaRPr lang="pt-BR"/>
           </a:p>
@@ -2398,7 +2398,7 @@
           <a:p>
             <a:fld id="{A613E9C6-444C-4D4F-8D4C-73E06C73E8DA}" type="datetimeFigureOut">
               <a:rPr lang="pt-BR" smtClean="0"/>
-              <a:t>13/11/2021</a:t>
+              <a:t>14/11/2021</a:t>
             </a:fld>
             <a:endParaRPr lang="pt-BR"/>
           </a:p>
@@ -2687,7 +2687,7 @@
           <a:p>
             <a:fld id="{A613E9C6-444C-4D4F-8D4C-73E06C73E8DA}" type="datetimeFigureOut">
               <a:rPr lang="pt-BR" smtClean="0"/>
-              <a:t>13/11/2021</a:t>
+              <a:t>14/11/2021</a:t>
             </a:fld>
             <a:endParaRPr lang="pt-BR"/>
           </a:p>
@@ -2930,7 +2930,7 @@
           <a:p>
             <a:fld id="{A613E9C6-444C-4D4F-8D4C-73E06C73E8DA}" type="datetimeFigureOut">
               <a:rPr lang="pt-BR" smtClean="0"/>
-              <a:t>13/11/2021</a:t>
+              <a:t>14/11/2021</a:t>
             </a:fld>
             <a:endParaRPr lang="pt-BR"/>
           </a:p>
@@ -3736,7 +3736,7 @@
         <p:spPr>
           <a:xfrm>
             <a:off x="1288831" y="1908865"/>
-            <a:ext cx="6093372" cy="2585323"/>
+            <a:ext cx="6093372" cy="2308324"/>
           </a:xfrm>
           <a:prstGeom prst="rect">
             <a:avLst/>
@@ -3750,7 +3750,7 @@
           <a:lstStyle/>
           <a:p>
             <a:r>
-              <a:rPr lang="en-US" sz="1800" b="0" i="0" u="none" strike="noStrike" dirty="0">
+              <a:rPr lang="en-US" sz="1600" b="0" i="0" u="none" strike="noStrike" dirty="0">
                 <a:solidFill>
                   <a:srgbClr val="997300"/>
                 </a:solidFill>
@@ -3760,7 +3760,7 @@
               <a:t>- </a:t>
             </a:r>
             <a:r>
-              <a:rPr lang="en-US" sz="1800" b="0" i="0" u="none" strike="noStrike" dirty="0" err="1">
+              <a:rPr lang="en-US" sz="1600" b="0" i="0" u="none" strike="noStrike" dirty="0" err="1">
                 <a:solidFill>
                   <a:srgbClr val="997300"/>
                 </a:solidFill>
@@ -3770,7 +3770,7 @@
               <a:t>agencia</a:t>
             </a:r>
             <a:r>
-              <a:rPr lang="en-US" sz="1800" b="0" i="0" u="none" strike="noStrike" dirty="0">
+              <a:rPr lang="en-US" sz="1600" b="0" i="0" u="none" strike="noStrike" dirty="0">
                 <a:solidFill>
                   <a:srgbClr val="997300"/>
                 </a:solidFill>
@@ -3782,7 +3782,7 @@
           </a:p>
           <a:p>
             <a:r>
-              <a:rPr lang="en-US" sz="1800" b="0" i="0" u="none" strike="noStrike" dirty="0">
+              <a:rPr lang="en-US" sz="1600" b="0" i="0" u="none" strike="noStrike" dirty="0">
                 <a:solidFill>
                   <a:srgbClr val="997300"/>
                 </a:solidFill>
@@ -3792,7 +3792,7 @@
               <a:t>- </a:t>
             </a:r>
             <a:r>
-              <a:rPr lang="en-US" sz="1800" b="0" i="0" u="none" strike="noStrike" dirty="0" err="1">
+              <a:rPr lang="en-US" sz="1600" b="0" i="0" u="none" strike="noStrike" dirty="0" err="1">
                 <a:solidFill>
                   <a:srgbClr val="997300"/>
                 </a:solidFill>
@@ -3802,7 +3802,7 @@
               <a:t>conta</a:t>
             </a:r>
             <a:r>
-              <a:rPr lang="en-US" sz="1800" b="0" i="0" u="none" strike="noStrike" dirty="0">
+              <a:rPr lang="en-US" sz="1600" b="0" i="0" u="none" strike="noStrike" dirty="0">
                 <a:solidFill>
                   <a:srgbClr val="997300"/>
                 </a:solidFill>
@@ -3814,7 +3814,7 @@
           </a:p>
           <a:p>
             <a:r>
-              <a:rPr lang="en-US" sz="1800" b="0" i="0" u="none" strike="noStrike" dirty="0">
+              <a:rPr lang="en-US" sz="1600" b="0" i="0" u="none" strike="noStrike" dirty="0">
                 <a:solidFill>
                   <a:srgbClr val="997300"/>
                 </a:solidFill>
@@ -3824,7 +3824,7 @@
               <a:t>- </a:t>
             </a:r>
             <a:r>
-              <a:rPr lang="en-US" sz="1800" b="0" i="0" u="none" strike="noStrike" dirty="0" err="1">
+              <a:rPr lang="en-US" sz="1600" b="0" i="0" u="none" strike="noStrike" dirty="0" err="1">
                 <a:solidFill>
                   <a:srgbClr val="997300"/>
                 </a:solidFill>
@@ -3834,7 +3834,7 @@
               <a:t>cpf</a:t>
             </a:r>
             <a:r>
-              <a:rPr lang="en-US" sz="1800" b="0" i="0" u="none" strike="noStrike" dirty="0">
+              <a:rPr lang="en-US" sz="1600" b="0" i="0" u="none" strike="noStrike" dirty="0">
                 <a:solidFill>
                   <a:srgbClr val="997300"/>
                 </a:solidFill>
@@ -3846,7 +3846,7 @@
           </a:p>
           <a:p>
             <a:r>
-              <a:rPr lang="en-US" sz="1800" b="0" i="0" u="none" strike="noStrike" dirty="0">
+              <a:rPr lang="en-US" sz="1600" b="0" i="0" u="none" strike="noStrike" dirty="0">
                 <a:solidFill>
                   <a:srgbClr val="997300"/>
                 </a:solidFill>
@@ -3856,7 +3856,7 @@
               <a:t>- </a:t>
             </a:r>
             <a:r>
-              <a:rPr lang="en-US" sz="1800" b="0" i="0" u="none" strike="noStrike" dirty="0" err="1">
+              <a:rPr lang="en-US" sz="1600" b="0" i="0" u="none" strike="noStrike" dirty="0" err="1">
                 <a:solidFill>
                   <a:srgbClr val="997300"/>
                 </a:solidFill>
@@ -3866,7 +3866,7 @@
               <a:t>nome</a:t>
             </a:r>
             <a:r>
-              <a:rPr lang="en-US" sz="1800" b="0" i="0" u="none" strike="noStrike" dirty="0">
+              <a:rPr lang="en-US" sz="1600" b="0" i="0" u="none" strike="noStrike" dirty="0">
                 <a:solidFill>
                   <a:srgbClr val="997300"/>
                 </a:solidFill>
@@ -3878,7 +3878,7 @@
           </a:p>
           <a:p>
             <a:r>
-              <a:rPr lang="en-US" sz="1800" b="0" i="0" u="none" strike="noStrike" dirty="0">
+              <a:rPr lang="en-US" sz="1600" b="0" i="0" u="none" strike="noStrike" dirty="0">
                 <a:solidFill>
                   <a:srgbClr val="997300"/>
                 </a:solidFill>
@@ -3888,7 +3888,7 @@
               <a:t>- </a:t>
             </a:r>
             <a:r>
-              <a:rPr lang="en-US" sz="1800" b="0" i="0" u="none" strike="noStrike" dirty="0" err="1">
+              <a:rPr lang="en-US" sz="1600" b="0" i="0" u="none" strike="noStrike" dirty="0" err="1">
                 <a:solidFill>
                   <a:srgbClr val="997300"/>
                 </a:solidFill>
@@ -3898,7 +3898,7 @@
               <a:t>nascimento</a:t>
             </a:r>
             <a:r>
-              <a:rPr lang="en-US" sz="1800" b="0" i="0" u="none" strike="noStrike" dirty="0">
+              <a:rPr lang="en-US" sz="1600" b="0" i="0" u="none" strike="noStrike" dirty="0">
                 <a:solidFill>
                   <a:srgbClr val="997300"/>
                 </a:solidFill>
@@ -3910,7 +3910,7 @@
           </a:p>
           <a:p>
             <a:r>
-              <a:rPr lang="en-US" sz="1800" b="0" i="0" u="none" strike="noStrike" dirty="0">
+              <a:rPr lang="en-US" sz="1600" b="0" i="0" u="none" strike="noStrike" dirty="0">
                 <a:solidFill>
                   <a:srgbClr val="997300"/>
                 </a:solidFill>
@@ -3920,7 +3920,7 @@
               <a:t>- </a:t>
             </a:r>
             <a:r>
-              <a:rPr lang="en-US" sz="1800" b="0" i="0" u="none" strike="noStrike" dirty="0" err="1">
+              <a:rPr lang="en-US" sz="1600" b="0" i="0" u="none" strike="noStrike" dirty="0" err="1">
                 <a:solidFill>
                   <a:srgbClr val="997300"/>
                 </a:solidFill>
@@ -3930,7 +3930,7 @@
               <a:t>endereco</a:t>
             </a:r>
             <a:r>
-              <a:rPr lang="en-US" sz="1800" b="0" i="0" u="none" strike="noStrike" dirty="0">
+              <a:rPr lang="en-US" sz="1600" b="0" i="0" u="none" strike="noStrike" dirty="0">
                 <a:solidFill>
                   <a:srgbClr val="997300"/>
                 </a:solidFill>
@@ -3942,7 +3942,7 @@
           </a:p>
           <a:p>
             <a:r>
-              <a:rPr lang="en-US" sz="1800" b="0" i="0" u="none" strike="noStrike" dirty="0">
+              <a:rPr lang="en-US" sz="1600" b="0" i="0" u="none" strike="noStrike" dirty="0">
                 <a:solidFill>
                   <a:srgbClr val="997300"/>
                 </a:solidFill>
@@ -3952,7 +3952,7 @@
               <a:t>- </a:t>
             </a:r>
             <a:r>
-              <a:rPr lang="en-US" sz="1800" b="0" i="0" u="none" strike="noStrike" dirty="0" err="1">
+              <a:rPr lang="en-US" sz="1600" b="0" i="0" u="none" strike="noStrike" dirty="0" err="1">
                 <a:solidFill>
                   <a:srgbClr val="997300"/>
                 </a:solidFill>
@@ -3962,7 +3962,7 @@
               <a:t>telefone</a:t>
             </a:r>
             <a:r>
-              <a:rPr lang="en-US" sz="1800" b="0" i="0" u="none" strike="noStrike" dirty="0">
+              <a:rPr lang="en-US" sz="1600" b="0" i="0" u="none" strike="noStrike" dirty="0">
                 <a:solidFill>
                   <a:srgbClr val="997300"/>
                 </a:solidFill>
@@ -3974,7 +3974,7 @@
           </a:p>
           <a:p>
             <a:r>
-              <a:rPr lang="en-US" sz="1800" b="0" i="0" u="none" strike="noStrike" dirty="0">
+              <a:rPr lang="en-US" sz="1600" b="0" i="0" u="none" strike="noStrike" dirty="0">
                 <a:solidFill>
                   <a:srgbClr val="997300"/>
                 </a:solidFill>
@@ -3984,7 +3984,7 @@
               <a:t>- </a:t>
             </a:r>
             <a:r>
-              <a:rPr lang="en-US" sz="1800" b="0" i="0" u="none" strike="noStrike" dirty="0" err="1">
+              <a:rPr lang="en-US" sz="1600" b="0" i="0" u="none" strike="noStrike" dirty="0" err="1">
                 <a:solidFill>
                   <a:srgbClr val="997300"/>
                 </a:solidFill>
@@ -3994,7 +3994,7 @@
               <a:t>saldo</a:t>
             </a:r>
             <a:r>
-              <a:rPr lang="en-US" sz="1800" b="0" i="0" u="none" strike="noStrike" dirty="0">
+              <a:rPr lang="en-US" sz="1600" b="0" i="0" u="none" strike="noStrike" dirty="0">
                 <a:solidFill>
                   <a:srgbClr val="997300"/>
                 </a:solidFill>
@@ -4006,7 +4006,7 @@
           </a:p>
           <a:p>
             <a:r>
-              <a:rPr lang="en-US" sz="1800" b="0" i="0" u="none" strike="noStrike" dirty="0">
+              <a:rPr lang="en-US" sz="1600" b="0" i="0" u="none" strike="noStrike" dirty="0">
                 <a:solidFill>
                   <a:srgbClr val="997300"/>
                 </a:solidFill>
@@ -4016,7 +4016,7 @@
               <a:t>- </a:t>
             </a:r>
             <a:r>
-              <a:rPr lang="en-US" sz="1800" b="0" i="0" u="none" strike="noStrike" dirty="0" err="1">
+              <a:rPr lang="en-US" sz="1600" b="0" i="0" u="none" strike="noStrike" dirty="0" err="1">
                 <a:solidFill>
                   <a:srgbClr val="997300"/>
                 </a:solidFill>
@@ -4026,7 +4026,7 @@
               <a:t>senha</a:t>
             </a:r>
             <a:r>
-              <a:rPr lang="en-US" sz="1800" b="0" i="0" u="none" strike="noStrike" dirty="0">
+              <a:rPr lang="en-US" sz="1600" b="0" i="0" u="none" strike="noStrike" dirty="0">
                 <a:solidFill>
                   <a:srgbClr val="997300"/>
                 </a:solidFill>
@@ -4035,7 +4035,7 @@
               </a:rPr>
               <a:t>: String</a:t>
             </a:r>
-            <a:endParaRPr lang="pt-BR" dirty="0"/>
+            <a:endParaRPr lang="pt-BR" sz="1600" dirty="0"/>
           </a:p>
         </p:txBody>
       </p:sp>
@@ -4054,7 +4054,7 @@
         <p:spPr>
           <a:xfrm>
             <a:off x="1365687" y="4868033"/>
-            <a:ext cx="2660432" cy="369332"/>
+            <a:ext cx="2660432" cy="338554"/>
           </a:xfrm>
           <a:prstGeom prst="rect">
             <a:avLst/>
@@ -4076,7 +4076,7 @@
               </a:spcAft>
             </a:pPr>
             <a:r>
-              <a:rPr lang="en-US" sz="1800" b="0" i="0" u="none" strike="noStrike" dirty="0">
+              <a:rPr lang="en-US" sz="1600" b="0" i="0" u="none" strike="noStrike" dirty="0">
                 <a:solidFill>
                   <a:srgbClr val="997300"/>
                 </a:solidFill>
@@ -4086,7 +4086,7 @@
               <a:t>+ </a:t>
             </a:r>
             <a:r>
-              <a:rPr lang="en-US" sz="1800" b="0" i="0" u="none" strike="noStrike" dirty="0" err="1">
+              <a:rPr lang="en-US" sz="1600" b="0" i="0" u="none" strike="noStrike" dirty="0" err="1">
                 <a:solidFill>
                   <a:srgbClr val="997300"/>
                 </a:solidFill>
@@ -4096,7 +4096,7 @@
               <a:t>MostrarCliente</a:t>
             </a:r>
             <a:r>
-              <a:rPr lang="en-US" sz="1800" b="0" i="0" u="none" strike="noStrike" dirty="0">
+              <a:rPr lang="en-US" sz="1600" b="0" i="0" u="none" strike="noStrike" dirty="0">
                 <a:solidFill>
                   <a:srgbClr val="997300"/>
                 </a:solidFill>
@@ -4105,7 +4105,7 @@
               </a:rPr>
               <a:t>(): void</a:t>
             </a:r>
-            <a:endParaRPr lang="pt-BR" dirty="0"/>
+            <a:endParaRPr lang="pt-BR" sz="1600" dirty="0"/>
           </a:p>
         </p:txBody>
       </p:sp>
@@ -4124,7 +4124,7 @@
         <p:spPr>
           <a:xfrm>
             <a:off x="7504382" y="1908865"/>
-            <a:ext cx="3279227" cy="2031325"/>
+            <a:ext cx="3279227" cy="1815882"/>
           </a:xfrm>
           <a:prstGeom prst="rect">
             <a:avLst/>
@@ -4138,7 +4138,7 @@
           <a:lstStyle/>
           <a:p>
             <a:r>
-              <a:rPr lang="en-US" sz="1800" b="0" i="0" u="none" strike="noStrike" dirty="0">
+              <a:rPr lang="en-US" sz="1600" b="0" i="0" u="none" strike="noStrike" dirty="0">
                 <a:solidFill>
                   <a:srgbClr val="6B4600"/>
                 </a:solidFill>
@@ -4148,20 +4148,29 @@
               <a:t>- </a:t>
             </a:r>
             <a:r>
-              <a:rPr lang="en-US" sz="1800" b="0" i="0" u="none" strike="noStrike" dirty="0" err="1">
+              <a:rPr lang="en-US" sz="1600" b="0" i="0" u="none" strike="noStrike" dirty="0" err="1">
                 <a:solidFill>
                   <a:srgbClr val="6B4600"/>
                 </a:solidFill>
                 <a:effectLst/>
                 <a:latin typeface="Arial" panose="020B0604020202020204" pitchFamily="34" charset="0"/>
               </a:rPr>
-              <a:t>numero_doc_CC</a:t>
-            </a:r>
-            <a:r>
-              <a:rPr lang="en-US" sz="1800" b="0" i="0" u="none" strike="noStrike" dirty="0">
+              <a:t>numero_doc_</a:t>
+            </a:r>
+            <a:r>
+              <a:rPr lang="en-US" sz="1600" dirty="0" err="1">
                 <a:solidFill>
                   <a:srgbClr val="6B4600"/>
                 </a:solidFill>
+                <a:latin typeface="Arial" panose="020B0604020202020204" pitchFamily="34" charset="0"/>
+              </a:rPr>
+              <a:t>cc</a:t>
+            </a:r>
+            <a:r>
+              <a:rPr lang="en-US" sz="1600" b="0" i="0" u="none" strike="noStrike" dirty="0">
+                <a:solidFill>
+                  <a:srgbClr val="6B4600"/>
+                </a:solidFill>
                 <a:effectLst/>
                 <a:latin typeface="Arial" panose="020B0604020202020204" pitchFamily="34" charset="0"/>
               </a:rPr>
@@ -4170,7 +4179,7 @@
           </a:p>
           <a:p>
             <a:r>
-              <a:rPr lang="en-US" sz="1800" b="0" i="0" u="none" strike="noStrike" dirty="0">
+              <a:rPr lang="en-US" sz="1600" b="0" i="0" u="none" strike="noStrike" dirty="0">
                 <a:solidFill>
                   <a:srgbClr val="6B4600"/>
                 </a:solidFill>
@@ -4180,7 +4189,7 @@
               <a:t>- </a:t>
             </a:r>
             <a:r>
-              <a:rPr lang="en-US" sz="1800" b="0" i="0" u="none" strike="noStrike" dirty="0" err="1">
+              <a:rPr lang="en-US" sz="1600" b="0" i="0" u="none" strike="noStrike" dirty="0" err="1">
                 <a:solidFill>
                   <a:srgbClr val="6B4600"/>
                 </a:solidFill>
@@ -4190,7 +4199,7 @@
               <a:t>agencia_cc</a:t>
             </a:r>
             <a:r>
-              <a:rPr lang="en-US" sz="1800" b="0" i="0" u="none" strike="noStrike" dirty="0">
+              <a:rPr lang="en-US" sz="1600" b="0" i="0" u="none" strike="noStrike" dirty="0">
                 <a:solidFill>
                   <a:srgbClr val="6B4600"/>
                 </a:solidFill>
@@ -4202,7 +4211,7 @@
           </a:p>
           <a:p>
             <a:r>
-              <a:rPr lang="en-US" sz="1800" b="0" i="0" u="none" strike="noStrike" dirty="0">
+              <a:rPr lang="en-US" sz="1600" b="0" i="0" u="none" strike="noStrike" dirty="0">
                 <a:solidFill>
                   <a:srgbClr val="6B4600"/>
                 </a:solidFill>
@@ -4212,17 +4221,17 @@
               <a:t>- </a:t>
             </a:r>
             <a:r>
-              <a:rPr lang="en-US" sz="1800" b="0" i="0" u="none" strike="noStrike" dirty="0" err="1">
+              <a:rPr lang="en-US" sz="1600" b="0" i="0" u="none" strike="noStrike" dirty="0" err="1">
                 <a:solidFill>
                   <a:srgbClr val="6B4600"/>
                 </a:solidFill>
                 <a:effectLst/>
                 <a:latin typeface="Arial" panose="020B0604020202020204" pitchFamily="34" charset="0"/>
               </a:rPr>
-              <a:t>conta_Cc</a:t>
-            </a:r>
-            <a:r>
-              <a:rPr lang="en-US" sz="1800" b="0" i="0" u="none" strike="noStrike" dirty="0">
+              <a:t>conta_cc</a:t>
+            </a:r>
+            <a:r>
+              <a:rPr lang="en-US" sz="1600" b="0" i="0" u="none" strike="noStrike" dirty="0">
                 <a:solidFill>
                   <a:srgbClr val="6B4600"/>
                 </a:solidFill>
@@ -4234,7 +4243,7 @@
           </a:p>
           <a:p>
             <a:r>
-              <a:rPr lang="en-US" sz="1800" b="0" i="0" u="none" strike="noStrike" dirty="0">
+              <a:rPr lang="en-US" sz="1600" b="0" i="0" u="none" strike="noStrike" dirty="0">
                 <a:solidFill>
                   <a:srgbClr val="6B4600"/>
                 </a:solidFill>
@@ -4244,17 +4253,17 @@
               <a:t>- </a:t>
             </a:r>
             <a:r>
-              <a:rPr lang="en-US" sz="1800" b="0" i="0" u="none" strike="noStrike" dirty="0" err="1">
+              <a:rPr lang="en-US" sz="1600" b="0" i="0" u="none" strike="noStrike" dirty="0" err="1">
                 <a:solidFill>
                   <a:srgbClr val="6B4600"/>
                 </a:solidFill>
                 <a:effectLst/>
                 <a:latin typeface="Arial" panose="020B0604020202020204" pitchFamily="34" charset="0"/>
               </a:rPr>
-              <a:t>valor_Cc</a:t>
-            </a:r>
-            <a:r>
-              <a:rPr lang="en-US" sz="1800" b="0" i="0" u="none" strike="noStrike" dirty="0">
+              <a:t>valor_cc</a:t>
+            </a:r>
+            <a:r>
+              <a:rPr lang="en-US" sz="1600" b="0" i="0" u="none" strike="noStrike" dirty="0">
                 <a:solidFill>
                   <a:srgbClr val="6B4600"/>
                 </a:solidFill>
@@ -4266,7 +4275,7 @@
           </a:p>
           <a:p>
             <a:r>
-              <a:rPr lang="en-US" sz="1800" b="0" i="0" u="none" strike="noStrike" dirty="0">
+              <a:rPr lang="en-US" sz="1600" b="0" i="0" u="none" strike="noStrike" dirty="0">
                 <a:solidFill>
                   <a:srgbClr val="6B4600"/>
                 </a:solidFill>
@@ -4276,17 +4285,17 @@
               <a:t>- </a:t>
             </a:r>
             <a:r>
-              <a:rPr lang="en-US" sz="1800" b="0" i="0" u="none" strike="noStrike" dirty="0" err="1">
+              <a:rPr lang="en-US" sz="1600" b="0" i="0" u="none" strike="noStrike" dirty="0" err="1">
                 <a:solidFill>
                   <a:srgbClr val="6B4600"/>
                 </a:solidFill>
                 <a:effectLst/>
                 <a:latin typeface="Arial" panose="020B0604020202020204" pitchFamily="34" charset="0"/>
               </a:rPr>
-              <a:t>tipo_Cc</a:t>
-            </a:r>
-            <a:r>
-              <a:rPr lang="en-US" sz="1800" b="0" i="0" u="none" strike="noStrike" dirty="0">
+              <a:t>tipo_cc</a:t>
+            </a:r>
+            <a:r>
+              <a:rPr lang="en-US" sz="1600" b="0" i="0" u="none" strike="noStrike" dirty="0">
                 <a:solidFill>
                   <a:srgbClr val="6B4600"/>
                 </a:solidFill>
@@ -4298,7 +4307,7 @@
           </a:p>
           <a:p>
             <a:r>
-              <a:rPr lang="en-US" sz="1800" b="0" i="0" u="none" strike="noStrike" dirty="0">
+              <a:rPr lang="en-US" sz="1600" b="0" i="0" u="none" strike="noStrike" dirty="0">
                 <a:solidFill>
                   <a:srgbClr val="6B4600"/>
                 </a:solidFill>
@@ -4308,7 +4317,7 @@
               <a:t>- </a:t>
             </a:r>
             <a:r>
-              <a:rPr lang="en-US" sz="1800" b="0" i="0" u="none" strike="noStrike" dirty="0" err="1">
+              <a:rPr lang="en-US" sz="1600" b="0" i="0" u="none" strike="noStrike" dirty="0" err="1">
                 <a:solidFill>
                   <a:srgbClr val="6B4600"/>
                 </a:solidFill>
@@ -4318,7 +4327,7 @@
               <a:t>data_ocorrencia_cc</a:t>
             </a:r>
             <a:r>
-              <a:rPr lang="en-US" sz="1800" b="0" i="0" u="none" strike="noStrike" dirty="0">
+              <a:rPr lang="en-US" sz="1600" b="0" i="0" u="none" strike="noStrike" dirty="0">
                 <a:solidFill>
                   <a:srgbClr val="6B4600"/>
                 </a:solidFill>
@@ -4330,7 +4339,7 @@
           </a:p>
           <a:p>
             <a:r>
-              <a:rPr lang="en-US" sz="1800" b="0" i="0" u="none" strike="noStrike" dirty="0">
+              <a:rPr lang="en-US" sz="1600" b="0" i="0" u="none" strike="noStrike" dirty="0">
                 <a:solidFill>
                   <a:srgbClr val="6B4600"/>
                 </a:solidFill>
@@ -4340,26 +4349,35 @@
               <a:t>- </a:t>
             </a:r>
             <a:r>
-              <a:rPr lang="en-US" sz="1800" b="0" i="0" u="none" strike="noStrike" dirty="0" err="1">
+              <a:rPr lang="en-US" sz="1600" b="0" i="0" u="none" strike="noStrike" dirty="0" err="1">
                 <a:solidFill>
                   <a:srgbClr val="6B4600"/>
                 </a:solidFill>
                 <a:effectLst/>
                 <a:latin typeface="Arial" panose="020B0604020202020204" pitchFamily="34" charset="0"/>
               </a:rPr>
-              <a:t>saldo_CC</a:t>
-            </a:r>
-            <a:r>
-              <a:rPr lang="en-US" sz="1800" b="0" i="0" u="none" strike="noStrike" dirty="0">
+              <a:t>saldo_</a:t>
+            </a:r>
+            <a:r>
+              <a:rPr lang="en-US" sz="1600" dirty="0" err="1">
                 <a:solidFill>
                   <a:srgbClr val="6B4600"/>
                 </a:solidFill>
+                <a:latin typeface="Arial" panose="020B0604020202020204" pitchFamily="34" charset="0"/>
+              </a:rPr>
+              <a:t>cc</a:t>
+            </a:r>
+            <a:r>
+              <a:rPr lang="en-US" sz="1600" b="0" i="0" u="none" strike="noStrike" dirty="0">
+                <a:solidFill>
+                  <a:srgbClr val="6B4600"/>
+                </a:solidFill>
                 <a:effectLst/>
                 <a:latin typeface="Arial" panose="020B0604020202020204" pitchFamily="34" charset="0"/>
               </a:rPr>
               <a:t>: Float</a:t>
             </a:r>
-            <a:endParaRPr lang="pt-BR" dirty="0"/>
+            <a:endParaRPr lang="pt-BR" sz="1600" dirty="0"/>
           </a:p>
         </p:txBody>
       </p:sp>
@@ -4378,7 +4396,7 @@
         <p:spPr>
           <a:xfrm>
             <a:off x="7373007" y="4524049"/>
-            <a:ext cx="3402724" cy="710451"/>
+            <a:ext cx="3402724" cy="648896"/>
           </a:xfrm>
           <a:prstGeom prst="rect">
             <a:avLst/>
@@ -4400,7 +4418,7 @@
               </a:spcAft>
             </a:pPr>
             <a:r>
-              <a:rPr lang="en-US" sz="1800" b="0" i="0" u="none" strike="noStrike" dirty="0">
+              <a:rPr lang="en-US" sz="1600" b="0" i="0" u="none" strike="noStrike" dirty="0">
                 <a:solidFill>
                   <a:srgbClr val="745000"/>
                 </a:solidFill>
@@ -4410,7 +4428,7 @@
               <a:t>+ </a:t>
             </a:r>
             <a:r>
-              <a:rPr lang="en-US" sz="1800" b="0" i="0" u="none" strike="noStrike" dirty="0" err="1">
+              <a:rPr lang="en-US" sz="1600" b="0" i="0" u="none" strike="noStrike" dirty="0" err="1">
                 <a:solidFill>
                   <a:srgbClr val="745000"/>
                 </a:solidFill>
@@ -4420,7 +4438,7 @@
               <a:t>AtualizarSaldo</a:t>
             </a:r>
             <a:r>
-              <a:rPr lang="en-US" sz="1800" b="0" i="0" u="none" strike="noStrike" dirty="0">
+              <a:rPr lang="en-US" sz="1600" b="0" i="0" u="none" strike="noStrike" dirty="0">
                 <a:solidFill>
                   <a:srgbClr val="745000"/>
                 </a:solidFill>
@@ -4440,7 +4458,7 @@
               </a:spcAft>
             </a:pPr>
             <a:r>
-              <a:rPr lang="en-US" sz="1800" b="0" i="0" u="none" strike="noStrike" dirty="0">
+              <a:rPr lang="en-US" sz="1600" b="0" i="0" u="none" strike="noStrike" dirty="0">
                 <a:solidFill>
                   <a:srgbClr val="745000"/>
                 </a:solidFill>
@@ -4450,7 +4468,7 @@
               <a:t>+ </a:t>
             </a:r>
             <a:r>
-              <a:rPr lang="en-US" sz="1800" b="0" i="0" u="none" strike="noStrike" dirty="0" err="1">
+              <a:rPr lang="en-US" sz="1600" b="0" i="0" u="none" strike="noStrike" dirty="0" err="1">
                 <a:solidFill>
                   <a:srgbClr val="745000"/>
                 </a:solidFill>
@@ -4460,16 +4478,16 @@
               <a:t>RegistrarOcorrencia</a:t>
             </a:r>
             <a:r>
-              <a:rPr lang="en-US" sz="1800" b="0" i="0" u="none" strike="noStrike" dirty="0">
+              <a:rPr lang="en-US" sz="1600" b="0" i="0" u="none" strike="noStrike" dirty="0">
                 <a:solidFill>
                   <a:srgbClr val="745000"/>
                 </a:solidFill>
                 <a:effectLst/>
                 <a:latin typeface="Arial" panose="020B0604020202020204" pitchFamily="34" charset="0"/>
               </a:rPr>
-              <a:t>): Integer</a:t>
-            </a:r>
-            <a:endParaRPr lang="pt-BR" dirty="0"/>
+              <a:t>(): Integer</a:t>
+            </a:r>
+            <a:endParaRPr lang="pt-BR" sz="1600" dirty="0"/>
           </a:p>
         </p:txBody>
       </p:sp>

</xml_diff>